<commit_message>
changes to slideshow and images
</commit_message>
<xml_diff>
--- a/Project_Digital_Divide.pptx
+++ b/Project_Digital_Divide.pptx
@@ -17,7 +17,7 @@
     <p:sldId id="295" r:id="rId8"/>
     <p:sldId id="305" r:id="rId9"/>
     <p:sldId id="294" r:id="rId10"/>
-    <p:sldId id="306" r:id="rId11"/>
+    <p:sldId id="307" r:id="rId11"/>
     <p:sldId id="296" r:id="rId12"/>
     <p:sldId id="297" r:id="rId13"/>
     <p:sldId id="298" r:id="rId14"/>
@@ -12199,15 +12199,17 @@
         </p:nvSpPr>
         <p:spPr>
           <a:xfrm>
-            <a:off x="-874643" y="-397564"/>
-            <a:ext cx="13066643" cy="768626"/>
+            <a:off x="0" y="829071"/>
+            <a:ext cx="12181241" cy="606993"/>
           </a:xfrm>
           <a:solidFill>
             <a:srgbClr val="00B050"/>
           </a:solidFill>
         </p:spPr>
         <p:txBody>
-          <a:bodyPr/>
+          <a:bodyPr>
+            <a:normAutofit fontScale="90000"/>
+          </a:bodyPr>
           <a:lstStyle/>
           <a:p>
             <a:r>
@@ -12235,8 +12237,8 @@
         </p:nvSpPr>
         <p:spPr>
           <a:xfrm>
-            <a:off x="-874643" y="371062"/>
-            <a:ext cx="13066643" cy="6944138"/>
+            <a:off x="0" y="1575918"/>
+            <a:ext cx="12192000" cy="5739282"/>
           </a:xfrm>
           <a:solidFill>
             <a:schemeClr val="accent1"/>
@@ -12275,7 +12277,7 @@
           <p:cNvPr id="6" name="Picture 5" descr="Map&#10;&#10;Description automatically generated">
             <a:extLst>
               <a:ext uri="{FF2B5EF4-FFF2-40B4-BE49-F238E27FC236}">
-                <a16:creationId xmlns:a16="http://schemas.microsoft.com/office/drawing/2014/main" id="{E819B4AB-B739-48DE-AE4A-FD0288C097E1}"/>
+                <a16:creationId xmlns:a16="http://schemas.microsoft.com/office/drawing/2014/main" id="{AEAEEF3B-A991-4578-B023-C788E7AF5985}"/>
               </a:ext>
             </a:extLst>
           </p:cNvPr>
@@ -12292,8 +12294,8 @@
         </p:blipFill>
         <p:spPr>
           <a:xfrm>
-            <a:off x="-874643" y="371062"/>
-            <a:ext cx="13066643" cy="5943984"/>
+            <a:off x="10758" y="1454604"/>
+            <a:ext cx="12181241" cy="5968172"/>
           </a:xfrm>
           <a:prstGeom prst="rect">
             <a:avLst/>
@@ -12303,7 +12305,7 @@
     </p:spTree>
     <p:extLst>
       <p:ext uri="{BB962C8B-B14F-4D97-AF65-F5344CB8AC3E}">
-        <p14:creationId xmlns:p14="http://schemas.microsoft.com/office/powerpoint/2010/main" val="1883607387"/>
+        <p14:creationId xmlns:p14="http://schemas.microsoft.com/office/powerpoint/2010/main" val="1398160520"/>
       </p:ext>
     </p:extLst>
   </p:cSld>
@@ -12348,8 +12350,8 @@
         </p:nvSpPr>
         <p:spPr>
           <a:xfrm>
-            <a:off x="-1816731" y="-654908"/>
-            <a:ext cx="14803681" cy="568411"/>
+            <a:off x="0" y="39319"/>
+            <a:ext cx="12192000" cy="568411"/>
           </a:xfrm>
           <a:solidFill>
             <a:srgbClr val="00B050"/>
@@ -12368,89 +12370,6 @@
           </a:p>
         </p:txBody>
       </p:sp>
-      <p:sp>
-        <p:nvSpPr>
-          <p:cNvPr id="3" name="Content Placeholder 2">
-            <a:extLst>
-              <a:ext uri="{FF2B5EF4-FFF2-40B4-BE49-F238E27FC236}">
-                <a16:creationId xmlns:a16="http://schemas.microsoft.com/office/drawing/2014/main" id="{655CCA0C-3BBD-48CC-9BD7-B81DAF6D0D9C}"/>
-              </a:ext>
-            </a:extLst>
-          </p:cNvPr>
-          <p:cNvSpPr>
-            <a:spLocks noGrp="1"/>
-          </p:cNvSpPr>
-          <p:nvPr>
-            <p:ph idx="1"/>
-          </p:nvPr>
-        </p:nvSpPr>
-        <p:spPr>
-          <a:xfrm>
-            <a:off x="-874643" y="371062"/>
-            <a:ext cx="13066643" cy="6944138"/>
-          </a:xfrm>
-          <a:solidFill>
-            <a:schemeClr val="accent1"/>
-          </a:solidFill>
-        </p:spPr>
-        <p:txBody>
-          <a:bodyPr>
-            <a:normAutofit/>
-          </a:bodyPr>
-          <a:lstStyle/>
-          <a:p>
-            <a:pPr marL="0" indent="0">
-              <a:buNone/>
-            </a:pPr>
-            <a:r>
-              <a:rPr lang="en-AU" sz="1400" b="0" dirty="0">
-                <a:solidFill>
-                  <a:srgbClr val="D4D4D4"/>
-                </a:solidFill>
-                <a:effectLst/>
-                <a:latin typeface="Congenial" panose="02000503040000020004" pitchFamily="2" charset="0"/>
-              </a:rPr>
-              <a:t> </a:t>
-            </a:r>
-          </a:p>
-          <a:p>
-            <a:pPr marL="0" indent="0">
-              <a:buNone/>
-            </a:pPr>
-            <a:endParaRPr lang="en-AU" sz="1400" dirty="0"/>
-          </a:p>
-        </p:txBody>
-      </p:sp>
-      <p:pic>
-        <p:nvPicPr>
-          <p:cNvPr id="18" name="Picture 17" descr="Chart, bar chart&#10;&#10;Description automatically generated">
-            <a:extLst>
-              <a:ext uri="{FF2B5EF4-FFF2-40B4-BE49-F238E27FC236}">
-                <a16:creationId xmlns:a16="http://schemas.microsoft.com/office/drawing/2014/main" id="{C01617B5-D0CB-4E37-9ED3-2C0EDF9AC838}"/>
-              </a:ext>
-            </a:extLst>
-          </p:cNvPr>
-          <p:cNvPicPr>
-            <a:picLocks noChangeAspect="1"/>
-          </p:cNvPicPr>
-          <p:nvPr/>
-        </p:nvPicPr>
-        <p:blipFill>
-          <a:blip r:embed="rId2"/>
-          <a:stretch>
-            <a:fillRect/>
-          </a:stretch>
-        </p:blipFill>
-        <p:spPr>
-          <a:xfrm>
-            <a:off x="-920057" y="371063"/>
-            <a:ext cx="13112057" cy="6944137"/>
-          </a:xfrm>
-          <a:prstGeom prst="rect">
-            <a:avLst/>
-          </a:prstGeom>
-        </p:spPr>
-      </p:pic>
       <p:pic>
         <p:nvPicPr>
           <p:cNvPr id="19" name="Picture 18" descr="Chart, bar chart&#10;&#10;Description automatically generated">
@@ -12473,14 +12392,44 @@
         </p:blipFill>
         <p:spPr>
           <a:xfrm>
-            <a:off x="-1816731" y="-86497"/>
-            <a:ext cx="14803682" cy="7554097"/>
+            <a:off x="0" y="607729"/>
+            <a:ext cx="12192000" cy="6859871"/>
           </a:xfrm>
           <a:prstGeom prst="rect">
             <a:avLst/>
           </a:prstGeom>
         </p:spPr>
       </p:pic>
+      <p:sp>
+        <p:nvSpPr>
+          <p:cNvPr id="5" name="Content Placeholder 4">
+            <a:extLst>
+              <a:ext uri="{FF2B5EF4-FFF2-40B4-BE49-F238E27FC236}">
+                <a16:creationId xmlns:a16="http://schemas.microsoft.com/office/drawing/2014/main" id="{C11D81F3-8183-457C-AE84-C4746859DD98}"/>
+              </a:ext>
+            </a:extLst>
+          </p:cNvPr>
+          <p:cNvSpPr>
+            <a:spLocks noGrp="1"/>
+          </p:cNvSpPr>
+          <p:nvPr>
+            <p:ph idx="1"/>
+          </p:nvPr>
+        </p:nvSpPr>
+        <p:spPr>
+          <a:xfrm>
+            <a:off x="0" y="39319"/>
+            <a:ext cx="12192000" cy="6953152"/>
+          </a:xfrm>
+        </p:spPr>
+        <p:txBody>
+          <a:bodyPr/>
+          <a:lstStyle/>
+          <a:p>
+            <a:endParaRPr lang="en-AU" dirty="0"/>
+          </a:p>
+        </p:txBody>
+      </p:sp>
     </p:spTree>
     <p:extLst>
       <p:ext uri="{BB962C8B-B14F-4D97-AF65-F5344CB8AC3E}">
@@ -12529,8 +12478,8 @@
         </p:nvSpPr>
         <p:spPr>
           <a:xfrm>
-            <a:off x="-1816731" y="-654908"/>
-            <a:ext cx="14803681" cy="568411"/>
+            <a:off x="1" y="0"/>
+            <a:ext cx="12192000" cy="568411"/>
           </a:xfrm>
           <a:solidFill>
             <a:srgbClr val="00B050"/>
@@ -12573,8 +12522,8 @@
         </p:blipFill>
         <p:spPr>
           <a:xfrm>
-            <a:off x="-1816731" y="0"/>
-            <a:ext cx="14008731" cy="7063409"/>
+            <a:off x="1" y="568412"/>
+            <a:ext cx="12191999" cy="6494998"/>
           </a:xfrm>
         </p:spPr>
       </p:pic>
@@ -12626,8 +12575,8 @@
         </p:nvSpPr>
         <p:spPr>
           <a:xfrm>
-            <a:off x="-1816731" y="-654908"/>
-            <a:ext cx="14803681" cy="568411"/>
+            <a:off x="0" y="-160061"/>
+            <a:ext cx="12192000" cy="568411"/>
           </a:xfrm>
           <a:solidFill>
             <a:srgbClr val="00B050"/>
@@ -12670,39 +12619,9 @@
         </p:blipFill>
         <p:spPr>
           <a:xfrm>
-            <a:off x="-1816731" y="-101458"/>
-            <a:ext cx="13001565" cy="6278421"/>
+            <a:off x="0" y="419548"/>
+            <a:ext cx="12192000" cy="6648226"/>
           </a:xfrm>
-        </p:spPr>
-      </p:pic>
-      <p:pic>
-        <p:nvPicPr>
-          <p:cNvPr id="13" name="Content Placeholder 11" descr="Chart, bar chart&#10;&#10;Description automatically generated">
-            <a:extLst>
-              <a:ext uri="{FF2B5EF4-FFF2-40B4-BE49-F238E27FC236}">
-                <a16:creationId xmlns:a16="http://schemas.microsoft.com/office/drawing/2014/main" id="{B992745D-8AA5-4B4C-AE2F-535F1526DA77}"/>
-              </a:ext>
-            </a:extLst>
-          </p:cNvPr>
-          <p:cNvPicPr>
-            <a:picLocks noChangeAspect="1"/>
-          </p:cNvPicPr>
-          <p:nvPr/>
-        </p:nvPicPr>
-        <p:blipFill>
-          <a:blip r:embed="rId2"/>
-          <a:stretch>
-            <a:fillRect/>
-          </a:stretch>
-        </p:blipFill>
-        <p:spPr>
-          <a:xfrm>
-            <a:off x="-1664331" y="50942"/>
-            <a:ext cx="13001565" cy="6278421"/>
-          </a:xfrm>
-          <a:prstGeom prst="rect">
-            <a:avLst/>
-          </a:prstGeom>
         </p:spPr>
       </p:pic>
     </p:spTree>
@@ -12753,8 +12672,8 @@
         </p:nvSpPr>
         <p:spPr>
           <a:xfrm>
-            <a:off x="-1816731" y="-654908"/>
-            <a:ext cx="14803681" cy="568411"/>
+            <a:off x="1" y="21415"/>
+            <a:ext cx="12192000" cy="568411"/>
           </a:xfrm>
           <a:solidFill>
             <a:srgbClr val="00B050"/>
@@ -12773,35 +12692,6 @@
           </a:p>
         </p:txBody>
       </p:sp>
-      <p:pic>
-        <p:nvPicPr>
-          <p:cNvPr id="6" name="Content Placeholder 5" descr="Chart, bar chart&#10;&#10;Description automatically generated">
-            <a:extLst>
-              <a:ext uri="{FF2B5EF4-FFF2-40B4-BE49-F238E27FC236}">
-                <a16:creationId xmlns:a16="http://schemas.microsoft.com/office/drawing/2014/main" id="{2E2C18DE-B318-43DB-8FB3-9A2B7BDF4FAD}"/>
-              </a:ext>
-            </a:extLst>
-          </p:cNvPr>
-          <p:cNvPicPr>
-            <a:picLocks noGrp="1" noChangeAspect="1"/>
-          </p:cNvPicPr>
-          <p:nvPr>
-            <p:ph idx="1"/>
-          </p:nvPr>
-        </p:nvPicPr>
-        <p:blipFill>
-          <a:blip r:embed="rId2"/>
-          <a:stretch>
-            <a:fillRect/>
-          </a:stretch>
-        </p:blipFill>
-        <p:spPr>
-          <a:xfrm>
-            <a:off x="-2279374" y="-35425"/>
-            <a:ext cx="14153322" cy="6212388"/>
-          </a:xfrm>
-        </p:spPr>
-      </p:pic>
       <p:pic>
         <p:nvPicPr>
           <p:cNvPr id="9" name="Content Placeholder 5" descr="Chart, bar chart&#10;&#10;Description automatically generated">
@@ -12824,8 +12714,8 @@
         </p:blipFill>
         <p:spPr>
           <a:xfrm>
-            <a:off x="-2126974" y="116975"/>
-            <a:ext cx="14153322" cy="6212388"/>
+            <a:off x="-9058" y="589826"/>
+            <a:ext cx="12035405" cy="5739536"/>
           </a:xfrm>
           <a:prstGeom prst="rect">
             <a:avLst/>
@@ -12880,8 +12770,8 @@
         </p:nvSpPr>
         <p:spPr>
           <a:xfrm>
-            <a:off x="-1816731" y="-654908"/>
-            <a:ext cx="14803681" cy="568411"/>
+            <a:off x="-1" y="6095"/>
+            <a:ext cx="12192002" cy="568411"/>
           </a:xfrm>
           <a:solidFill>
             <a:srgbClr val="00B050"/>
@@ -12924,8 +12814,8 @@
         </p:blipFill>
         <p:spPr>
           <a:xfrm>
-            <a:off x="-1816731" y="-86496"/>
-            <a:ext cx="13173844" cy="7023146"/>
+            <a:off x="-1" y="574506"/>
+            <a:ext cx="12192001" cy="6520357"/>
           </a:xfrm>
         </p:spPr>
       </p:pic>
@@ -12977,8 +12867,8 @@
         </p:nvSpPr>
         <p:spPr>
           <a:xfrm>
-            <a:off x="-1816731" y="-654908"/>
-            <a:ext cx="14803681" cy="568411"/>
+            <a:off x="1" y="0"/>
+            <a:ext cx="12192000" cy="568411"/>
           </a:xfrm>
           <a:solidFill>
             <a:srgbClr val="00B050"/>
@@ -13021,8 +12911,8 @@
         </p:blipFill>
         <p:spPr>
           <a:xfrm>
-            <a:off x="-4983012" y="-43249"/>
-            <a:ext cx="15427318" cy="6944497"/>
+            <a:off x="1" y="568411"/>
+            <a:ext cx="12223230" cy="6289589"/>
           </a:xfrm>
         </p:spPr>
       </p:pic>
@@ -13074,8 +12964,8 @@
         </p:nvSpPr>
         <p:spPr>
           <a:xfrm>
-            <a:off x="-1816731" y="-654908"/>
-            <a:ext cx="14803681" cy="568411"/>
+            <a:off x="1" y="-15701"/>
+            <a:ext cx="12192000" cy="568411"/>
           </a:xfrm>
           <a:solidFill>
             <a:srgbClr val="00B050"/>
@@ -13118,8 +13008,8 @@
         </p:blipFill>
         <p:spPr>
           <a:xfrm>
-            <a:off x="-5133136" y="-86497"/>
-            <a:ext cx="14803680" cy="7298506"/>
+            <a:off x="88135" y="552710"/>
+            <a:ext cx="10550484" cy="6305290"/>
           </a:xfrm>
         </p:spPr>
       </p:pic>
@@ -13171,8 +13061,8 @@
         </p:nvSpPr>
         <p:spPr>
           <a:xfrm>
-            <a:off x="-3794077" y="-654908"/>
-            <a:ext cx="16781028" cy="568411"/>
+            <a:off x="0" y="3366"/>
+            <a:ext cx="12192000" cy="568411"/>
           </a:xfrm>
           <a:solidFill>
             <a:srgbClr val="00B050"/>
@@ -13215,8 +13105,8 @@
         </p:blipFill>
         <p:spPr>
           <a:xfrm>
-            <a:off x="-6921286" y="-86497"/>
-            <a:ext cx="15778683" cy="7626346"/>
+            <a:off x="83232" y="571777"/>
+            <a:ext cx="10276382" cy="6287478"/>
           </a:xfrm>
         </p:spPr>
       </p:pic>
@@ -13947,9 +13837,34 @@
                 <a:effectLst/>
                 <a:latin typeface="Congenial" panose="02000503040000020004" pitchFamily="2" charset="0"/>
               </a:rPr>
-              <a:t> file.</a:t>
-            </a:r>
-            <a:br>
+              <a:t> </a:t>
+            </a:r>
+            <a:r>
+              <a:rPr lang="en-AU" sz="3500" b="0">
+                <a:solidFill>
+                  <a:srgbClr val="D4D4D4"/>
+                </a:solidFill>
+                <a:effectLst/>
+                <a:latin typeface="Congenial" panose="02000503040000020004" pitchFamily="2" charset="0"/>
+              </a:rPr>
+              <a:t>file.</a:t>
+            </a:r>
+          </a:p>
+          <a:p>
+            <a:pPr marL="0" indent="0">
+              <a:buNone/>
+            </a:pPr>
+            <a:r>
+              <a:rPr lang="en-AU" sz="3500" b="0">
+                <a:solidFill>
+                  <a:srgbClr val="D4D4D4"/>
+                </a:solidFill>
+                <a:effectLst/>
+                <a:latin typeface="Congenial" panose="02000503040000020004" pitchFamily="2" charset="0"/>
+              </a:rPr>
+              <a:t>        </a:t>
+            </a:r>
+            <a:r>
               <a:rPr lang="en-AU" sz="3500" b="0" dirty="0">
                 <a:solidFill>
                   <a:srgbClr val="D4D4D4"/>
@@ -13957,16 +13872,7 @@
                 <a:effectLst/>
                 <a:latin typeface="Congenial" panose="02000503040000020004" pitchFamily="2" charset="0"/>
               </a:rPr>
-            </a:br>
-            <a:r>
-              <a:rPr lang="en-AU" sz="3500" b="0" dirty="0">
-                <a:solidFill>
-                  <a:srgbClr val="D4D4D4"/>
-                </a:solidFill>
-                <a:effectLst/>
-                <a:latin typeface="Congenial" panose="02000503040000020004" pitchFamily="2" charset="0"/>
-              </a:rPr>
-              <a:t>        -https://www.fastmetrics.com/internet-connection-speed-by-country.php#median-internet-speeds-2020</a:t>
+              <a:t>-https://www.fastmetrics.com/internet-connection-speed-by-country.php#median-internet-speeds-2020</a:t>
             </a:r>
           </a:p>
           <a:p>
@@ -15310,8 +15216,8 @@
         </p:nvSpPr>
         <p:spPr>
           <a:xfrm>
-            <a:off x="-1" y="-1413163"/>
-            <a:ext cx="13256797" cy="708828"/>
+            <a:off x="0" y="-122243"/>
+            <a:ext cx="12192000" cy="708828"/>
           </a:xfrm>
           <a:solidFill>
             <a:srgbClr val="00B050"/>
@@ -15405,8 +15311,8 @@
         </p:blipFill>
         <p:spPr>
           <a:xfrm>
-            <a:off x="-1" y="-704335"/>
-            <a:ext cx="12614314" cy="6458851"/>
+            <a:off x="-63164" y="616269"/>
+            <a:ext cx="12255163" cy="6006204"/>
           </a:xfrm>
           <a:prstGeom prst="rect">
             <a:avLst/>
@@ -15612,15 +15518,17 @@
         </p:nvSpPr>
         <p:spPr>
           <a:xfrm>
-            <a:off x="-874643" y="-397564"/>
-            <a:ext cx="13066643" cy="768626"/>
+            <a:off x="0" y="829071"/>
+            <a:ext cx="12181241" cy="606993"/>
           </a:xfrm>
           <a:solidFill>
             <a:srgbClr val="00B050"/>
           </a:solidFill>
         </p:spPr>
         <p:txBody>
-          <a:bodyPr/>
+          <a:bodyPr>
+            <a:normAutofit fontScale="90000"/>
+          </a:bodyPr>
           <a:lstStyle/>
           <a:p>
             <a:r>
@@ -15648,8 +15556,8 @@
         </p:nvSpPr>
         <p:spPr>
           <a:xfrm>
-            <a:off x="-874643" y="371062"/>
-            <a:ext cx="13066643" cy="6944138"/>
+            <a:off x="0" y="1575918"/>
+            <a:ext cx="12192000" cy="5739282"/>
           </a:xfrm>
           <a:solidFill>
             <a:schemeClr val="accent1"/>
@@ -15705,8 +15613,8 @@
         </p:blipFill>
         <p:spPr>
           <a:xfrm>
-            <a:off x="-781878" y="554072"/>
-            <a:ext cx="12973878" cy="5170867"/>
+            <a:off x="18402" y="1441524"/>
+            <a:ext cx="12173598" cy="5572461"/>
           </a:xfrm>
           <a:prstGeom prst="rect">
             <a:avLst/>

</xml_diff>